<commit_message>
Module 04 ready to go
</commit_message>
<xml_diff>
--- a/Slides/Lesson 4.1 Lists.pptx
+++ b/Slides/Lesson 4.1 Lists.pptx
@@ -238,7 +238,7 @@
             <a:fld id="{CF8F25F6-E1EF-4065-8525-42EDEBD9BD22}" type="datetimeFigureOut">
               <a:rPr lang="en-US" smtClean="0"/>
               <a:pPr/>
-              <a:t>8/24/2015</a:t>
+              <a:t>8/25/2015</a:t>
             </a:fld>
             <a:endParaRPr lang="en-US"/>
           </a:p>
@@ -727,15 +727,7 @@
           <a:bodyPr/>
           <a:lstStyle/>
           <a:p>
-            <a:endParaRPr lang="en-US" sz="1200" kern="1200" dirty="0">
-              <a:solidFill>
-                <a:schemeClr val="tx1"/>
-              </a:solidFill>
-              <a:effectLst/>
-              <a:latin typeface="+mn-lt"/>
-              <a:ea typeface="+mn-ea"/>
-              <a:cs typeface="+mn-cs"/>
-            </a:endParaRPr>
+            <a:endParaRPr lang="en-US"/>
           </a:p>
         </p:txBody>
       </p:sp>
@@ -757,7 +749,7 @@
             <a:fld id="{00E1DFD8-B619-4FFF-B366-BDCC98D08110}" type="slidenum">
               <a:rPr lang="en-US" smtClean="0"/>
               <a:pPr/>
-              <a:t>5</a:t>
+              <a:t>3</a:t>
             </a:fld>
             <a:endParaRPr lang="en-US"/>
           </a:p>
@@ -766,7 +758,7 @@
     </p:spTree>
     <p:extLst>
       <p:ext uri="{BB962C8B-B14F-4D97-AF65-F5344CB8AC3E}">
-        <p14:creationId xmlns:p14="http://schemas.microsoft.com/office/powerpoint/2010/main" val="2282877878"/>
+        <p14:creationId xmlns:p14="http://schemas.microsoft.com/office/powerpoint/2010/main" val="1026133936"/>
       </p:ext>
     </p:extLst>
   </p:cSld>
@@ -820,7 +812,15 @@
           <a:bodyPr/>
           <a:lstStyle/>
           <a:p>
-            <a:endParaRPr lang="en-US" dirty="0"/>
+            <a:endParaRPr lang="en-US" sz="1200" kern="1200" dirty="0">
+              <a:solidFill>
+                <a:schemeClr val="tx1"/>
+              </a:solidFill>
+              <a:effectLst/>
+              <a:latin typeface="+mn-lt"/>
+              <a:ea typeface="+mn-ea"/>
+              <a:cs typeface="+mn-cs"/>
+            </a:endParaRPr>
           </a:p>
         </p:txBody>
       </p:sp>
@@ -842,7 +842,7 @@
             <a:fld id="{00E1DFD8-B619-4FFF-B366-BDCC98D08110}" type="slidenum">
               <a:rPr lang="en-US" smtClean="0"/>
               <a:pPr/>
-              <a:t>9</a:t>
+              <a:t>5</a:t>
             </a:fld>
             <a:endParaRPr lang="en-US"/>
           </a:p>
@@ -851,7 +851,7 @@
     </p:spTree>
     <p:extLst>
       <p:ext uri="{BB962C8B-B14F-4D97-AF65-F5344CB8AC3E}">
-        <p14:creationId xmlns:p14="http://schemas.microsoft.com/office/powerpoint/2010/main" val="3244517845"/>
+        <p14:creationId xmlns:p14="http://schemas.microsoft.com/office/powerpoint/2010/main" val="2282877878"/>
       </p:ext>
     </p:extLst>
   </p:cSld>
@@ -927,7 +927,7 @@
             <a:fld id="{00E1DFD8-B619-4FFF-B366-BDCC98D08110}" type="slidenum">
               <a:rPr lang="en-US" smtClean="0"/>
               <a:pPr/>
-              <a:t>16</a:t>
+              <a:t>9</a:t>
             </a:fld>
             <a:endParaRPr lang="en-US"/>
           </a:p>
@@ -936,7 +936,7 @@
     </p:spTree>
     <p:extLst>
       <p:ext uri="{BB962C8B-B14F-4D97-AF65-F5344CB8AC3E}">
-        <p14:creationId xmlns:p14="http://schemas.microsoft.com/office/powerpoint/2010/main" val="2830916769"/>
+        <p14:creationId xmlns:p14="http://schemas.microsoft.com/office/powerpoint/2010/main" val="3244517845"/>
       </p:ext>
     </p:extLst>
   </p:cSld>
@@ -990,7 +990,7 @@
           <a:bodyPr/>
           <a:lstStyle/>
           <a:p>
-            <a:endParaRPr lang="en-US"/>
+            <a:endParaRPr lang="en-US" dirty="0"/>
           </a:p>
         </p:txBody>
       </p:sp>
@@ -1012,7 +1012,7 @@
             <a:fld id="{00E1DFD8-B619-4FFF-B366-BDCC98D08110}" type="slidenum">
               <a:rPr lang="en-US" smtClean="0"/>
               <a:pPr/>
-              <a:t>17</a:t>
+              <a:t>16</a:t>
             </a:fld>
             <a:endParaRPr lang="en-US"/>
           </a:p>
@@ -1021,7 +1021,7 @@
     </p:spTree>
     <p:extLst>
       <p:ext uri="{BB962C8B-B14F-4D97-AF65-F5344CB8AC3E}">
-        <p14:creationId xmlns:p14="http://schemas.microsoft.com/office/powerpoint/2010/main" val="61684927"/>
+        <p14:creationId xmlns:p14="http://schemas.microsoft.com/office/powerpoint/2010/main" val="2830916769"/>
       </p:ext>
     </p:extLst>
   </p:cSld>
@@ -1075,6 +1075,91 @@
           <a:bodyPr/>
           <a:lstStyle/>
           <a:p>
+            <a:endParaRPr lang="en-US"/>
+          </a:p>
+        </p:txBody>
+      </p:sp>
+      <p:sp>
+        <p:nvSpPr>
+          <p:cNvPr id="4" name="Slide Number Placeholder 3"/>
+          <p:cNvSpPr>
+            <a:spLocks noGrp="1"/>
+          </p:cNvSpPr>
+          <p:nvPr>
+            <p:ph type="sldNum" sz="quarter" idx="10"/>
+          </p:nvPr>
+        </p:nvSpPr>
+        <p:spPr/>
+        <p:txBody>
+          <a:bodyPr/>
+          <a:lstStyle/>
+          <a:p>
+            <a:fld id="{00E1DFD8-B619-4FFF-B366-BDCC98D08110}" type="slidenum">
+              <a:rPr lang="en-US" smtClean="0"/>
+              <a:pPr/>
+              <a:t>17</a:t>
+            </a:fld>
+            <a:endParaRPr lang="en-US"/>
+          </a:p>
+        </p:txBody>
+      </p:sp>
+    </p:spTree>
+    <p:extLst>
+      <p:ext uri="{BB962C8B-B14F-4D97-AF65-F5344CB8AC3E}">
+        <p14:creationId xmlns:p14="http://schemas.microsoft.com/office/powerpoint/2010/main" val="61684927"/>
+      </p:ext>
+    </p:extLst>
+  </p:cSld>
+  <p:clrMapOvr>
+    <a:masterClrMapping/>
+  </p:clrMapOvr>
+</p:notes>
+</file>
+
+<file path=ppt/notesSlides/notesSlide8.xml><?xml version="1.0" encoding="utf-8"?>
+<p:notes xmlns:a="http://schemas.openxmlformats.org/drawingml/2006/main" xmlns:r="http://schemas.openxmlformats.org/officeDocument/2006/relationships" xmlns:p="http://schemas.openxmlformats.org/presentationml/2006/main">
+  <p:cSld>
+    <p:spTree>
+      <p:nvGrpSpPr>
+        <p:cNvPr id="1" name=""/>
+        <p:cNvGrpSpPr/>
+        <p:nvPr/>
+      </p:nvGrpSpPr>
+      <p:grpSpPr>
+        <a:xfrm>
+          <a:off x="0" y="0"/>
+          <a:ext cx="0" cy="0"/>
+          <a:chOff x="0" y="0"/>
+          <a:chExt cx="0" cy="0"/>
+        </a:xfrm>
+      </p:grpSpPr>
+      <p:sp>
+        <p:nvSpPr>
+          <p:cNvPr id="2" name="Slide Image Placeholder 1"/>
+          <p:cNvSpPr>
+            <a:spLocks noGrp="1" noRot="1" noChangeAspect="1"/>
+          </p:cNvSpPr>
+          <p:nvPr>
+            <p:ph type="sldImg"/>
+          </p:nvPr>
+        </p:nvSpPr>
+        <p:spPr/>
+      </p:sp>
+      <p:sp>
+        <p:nvSpPr>
+          <p:cNvPr id="3" name="Notes Placeholder 2"/>
+          <p:cNvSpPr>
+            <a:spLocks noGrp="1"/>
+          </p:cNvSpPr>
+          <p:nvPr>
+            <p:ph type="body" idx="1"/>
+          </p:nvPr>
+        </p:nvSpPr>
+        <p:spPr/>
+        <p:txBody>
+          <a:bodyPr/>
+          <a:lstStyle/>
+          <a:p>
             <a:endParaRPr lang="en-US" sz="2000" dirty="0">
               <a:solidFill>
                 <a:srgbClr val="FF0000"/>
@@ -1120,7 +1205,7 @@
 </p:notes>
 </file>
 
-<file path=ppt/notesSlides/notesSlide8.xml><?xml version="1.0" encoding="utf-8"?>
+<file path=ppt/notesSlides/notesSlide9.xml><?xml version="1.0" encoding="utf-8"?>
 <p:notes xmlns:a="http://schemas.openxmlformats.org/drawingml/2006/main" xmlns:r="http://schemas.openxmlformats.org/officeDocument/2006/relationships" xmlns:p="http://schemas.openxmlformats.org/presentationml/2006/main">
   <p:cSld>
     <p:spTree>
@@ -1394,7 +1479,7 @@
           <a:p>
             <a:fld id="{2F1F79F5-7BEC-496A-AFC7-876E38F64D71}" type="datetime1">
               <a:rPr lang="en-US" smtClean="0"/>
-              <a:t>8/24/2015</a:t>
+              <a:t>8/25/2015</a:t>
             </a:fld>
             <a:endParaRPr lang="en-US"/>
           </a:p>
@@ -1496,7 +1581,7 @@
           <a:p>
             <a:fld id="{0A05703A-7669-4FEA-9056-25299B4D29D4}" type="datetime1">
               <a:rPr lang="en-US" smtClean="0"/>
-              <a:t>8/24/2015</a:t>
+              <a:t>8/25/2015</a:t>
             </a:fld>
             <a:endParaRPr lang="en-US"/>
           </a:p>
@@ -1773,7 +1858,7 @@
           <a:p>
             <a:fld id="{6E5077B5-BB57-49DB-88CA-226A139E5C01}" type="datetime1">
               <a:rPr lang="en-US" smtClean="0"/>
-              <a:t>8/24/2015</a:t>
+              <a:t>8/25/2015</a:t>
             </a:fld>
             <a:endParaRPr lang="en-US"/>
           </a:p>
@@ -2026,7 +2111,7 @@
           <a:p>
             <a:fld id="{C48D9447-CBD6-49A1-89FD-8512A8CF8999}" type="datetime1">
               <a:rPr lang="en-US" smtClean="0"/>
-              <a:t>8/24/2015</a:t>
+              <a:t>8/25/2015</a:t>
             </a:fld>
             <a:endParaRPr lang="en-US"/>
           </a:p>
@@ -2196,7 +2281,7 @@
           <a:p>
             <a:fld id="{A3639A2A-823D-48B7-9ACE-7FAF42870BA9}" type="datetime1">
               <a:rPr lang="en-US" smtClean="0"/>
-              <a:t>8/24/2015</a:t>
+              <a:t>8/25/2015</a:t>
             </a:fld>
             <a:endParaRPr lang="en-US"/>
           </a:p>
@@ -2376,7 +2461,7 @@
           <a:p>
             <a:fld id="{ED1B6996-82E9-463C-972C-7B56056E426C}" type="datetime1">
               <a:rPr lang="en-US" smtClean="0"/>
-              <a:t>8/24/2015</a:t>
+              <a:t>8/25/2015</a:t>
             </a:fld>
             <a:endParaRPr lang="en-US"/>
           </a:p>
@@ -2552,7 +2637,7 @@
           <a:p>
             <a:fld id="{E22ED4DA-448D-4BB1-B935-CC112220207B}" type="datetime1">
               <a:rPr lang="en-US" smtClean="0"/>
-              <a:t>8/24/2015</a:t>
+              <a:t>8/25/2015</a:t>
             </a:fld>
             <a:endParaRPr lang="en-US"/>
           </a:p>
@@ -2734,7 +2819,7 @@
           <a:p>
             <a:fld id="{E22ED4DA-448D-4BB1-B935-CC112220207B}" type="datetime1">
               <a:rPr lang="en-US" smtClean="0"/>
-              <a:t>8/24/2015</a:t>
+              <a:t>8/25/2015</a:t>
             </a:fld>
             <a:endParaRPr lang="en-US"/>
           </a:p>
@@ -3003,7 +3088,7 @@
           <a:p>
             <a:fld id="{FF5D65A6-AB94-4435-B0B7-3743215FA46C}" type="datetime1">
               <a:rPr lang="en-US" smtClean="0"/>
-              <a:t>8/24/2015</a:t>
+              <a:t>8/25/2015</a:t>
             </a:fld>
             <a:endParaRPr lang="en-US"/>
           </a:p>
@@ -3188,7 +3273,7 @@
           <a:p>
             <a:fld id="{FF5D65A6-AB94-4435-B0B7-3743215FA46C}" type="datetime1">
               <a:rPr lang="en-US" smtClean="0"/>
-              <a:t>8/24/2015</a:t>
+              <a:t>8/25/2015</a:t>
             </a:fld>
             <a:endParaRPr lang="en-US"/>
           </a:p>
@@ -3490,7 +3575,7 @@
           <a:p>
             <a:fld id="{7C193DC4-6EF0-48C9-B29C-616106A645E1}" type="datetime1">
               <a:rPr lang="en-US" smtClean="0"/>
-              <a:t>8/24/2015</a:t>
+              <a:t>8/25/2015</a:t>
             </a:fld>
             <a:endParaRPr lang="en-US"/>
           </a:p>
@@ -3778,7 +3863,7 @@
           <a:p>
             <a:fld id="{5D1846AD-9252-4647-9435-4C2AC365653A}" type="datetime1">
               <a:rPr lang="en-US" smtClean="0"/>
-              <a:t>8/24/2015</a:t>
+              <a:t>8/25/2015</a:t>
             </a:fld>
             <a:endParaRPr lang="en-US"/>
           </a:p>
@@ -4200,7 +4285,7 @@
           <a:p>
             <a:fld id="{CE56DC10-3561-4063-A6AF-C1CC7A41040A}" type="datetime1">
               <a:rPr lang="en-US" smtClean="0"/>
-              <a:t>8/24/2015</a:t>
+              <a:t>8/25/2015</a:t>
             </a:fld>
             <a:endParaRPr lang="en-US"/>
           </a:p>
@@ -4318,7 +4403,7 @@
           <a:p>
             <a:fld id="{2F7B77F5-1464-4F6B-92A8-64FC8A508293}" type="datetime1">
               <a:rPr lang="en-US" smtClean="0"/>
-              <a:t>8/24/2015</a:t>
+              <a:t>8/25/2015</a:t>
             </a:fld>
             <a:endParaRPr lang="en-US"/>
           </a:p>
@@ -4550,7 +4635,7 @@
           <a:p>
             <a:fld id="{02B3F677-983B-48DB-ADFD-63FE6CBC7FB2}" type="datetime1">
               <a:rPr lang="en-US" smtClean="0"/>
-              <a:t>8/24/2015</a:t>
+              <a:t>8/25/2015</a:t>
             </a:fld>
             <a:endParaRPr lang="en-US"/>
           </a:p>
@@ -7301,14 +7386,7 @@
                 <a:latin typeface="Consolas" pitchFamily="49" charset="0"/>
                 <a:cs typeface="Consolas" pitchFamily="49" charset="0"/>
               </a:rPr>
-              <a:t> </a:t>
-            </a:r>
-            <a:r>
-              <a:rPr lang="en-US" sz="1900" b="1" dirty="0" smtClean="0">
-                <a:latin typeface="Consolas" pitchFamily="49" charset="0"/>
-                <a:cs typeface="Consolas" pitchFamily="49" charset="0"/>
-              </a:rPr>
-              <a:t>is one of</a:t>
+              <a:t> is one of</a:t>
             </a:r>
           </a:p>
           <a:p>
@@ -7365,10 +7443,55 @@
                 <a:latin typeface="Consolas" pitchFamily="49" charset="0"/>
                 <a:cs typeface="Consolas" pitchFamily="49" charset="0"/>
               </a:rPr>
-              <a:t>: a sequence </a:t>
-            </a:r>
+              <a:t>: a sequence of X's with no elements</a:t>
+            </a:r>
+          </a:p>
+          <a:p>
+            <a:pPr>
+              <a:buNone/>
+            </a:pPr>
             <a:r>
               <a:rPr lang="en-US" sz="1900" b="1" dirty="0" smtClean="0">
+                <a:latin typeface="Consolas" pitchFamily="49" charset="0"/>
+                <a:cs typeface="Consolas" pitchFamily="49" charset="0"/>
+              </a:rPr>
+              <a:t>-- (cons X </a:t>
+            </a:r>
+            <a:r>
+              <a:rPr lang="en-US" sz="1900" b="1" dirty="0" err="1" smtClean="0">
+                <a:latin typeface="Consolas" pitchFamily="49" charset="0"/>
+                <a:cs typeface="Consolas" pitchFamily="49" charset="0"/>
+              </a:rPr>
+              <a:t>ListOfX</a:t>
+            </a:r>
+            <a:r>
+              <a:rPr lang="en-US" sz="1900" b="1" dirty="0" smtClean="0">
+                <a:latin typeface="Consolas" pitchFamily="49" charset="0"/>
+                <a:cs typeface="Consolas" pitchFamily="49" charset="0"/>
+              </a:rPr>
+              <a:t>)</a:t>
+            </a:r>
+          </a:p>
+          <a:p>
+            <a:pPr>
+              <a:buNone/>
+            </a:pPr>
+            <a:r>
+              <a:rPr lang="en-US" sz="1900" b="1" dirty="0">
+                <a:latin typeface="Consolas" pitchFamily="49" charset="0"/>
+                <a:cs typeface="Consolas" pitchFamily="49" charset="0"/>
+              </a:rPr>
+              <a:t> </a:t>
+            </a:r>
+            <a:r>
+              <a:rPr lang="en-US" sz="1900" b="1" dirty="0" smtClean="0">
+                <a:latin typeface="Consolas" pitchFamily="49" charset="0"/>
+                <a:cs typeface="Consolas" pitchFamily="49" charset="0"/>
+              </a:rPr>
+              <a:t>  </a:t>
+            </a:r>
+            <a:r>
+              <a:rPr lang="en-US" sz="1900" b="1" dirty="0" err="1" smtClean="0">
                 <a:solidFill>
                   <a:schemeClr val="accent2">
                     <a:lumMod val="60000"/>
@@ -7378,7 +7501,7 @@
                 <a:latin typeface="Consolas" pitchFamily="49" charset="0"/>
                 <a:cs typeface="Consolas" pitchFamily="49" charset="0"/>
               </a:rPr>
-              <a:t>of X's with </a:t>
+              <a:t>interp</a:t>
             </a:r>
             <a:r>
               <a:rPr lang="en-US" sz="1900" b="1" dirty="0" smtClean="0">
@@ -7391,56 +7514,7 @@
                 <a:latin typeface="Consolas" pitchFamily="49" charset="0"/>
                 <a:cs typeface="Consolas" pitchFamily="49" charset="0"/>
               </a:rPr>
-              <a:t>no elements</a:t>
-            </a:r>
-          </a:p>
-          <a:p>
-            <a:pPr>
-              <a:buNone/>
-            </a:pPr>
-            <a:r>
-              <a:rPr lang="en-US" sz="1900" b="1" dirty="0" smtClean="0">
-                <a:latin typeface="Consolas" pitchFamily="49" charset="0"/>
-                <a:cs typeface="Consolas" pitchFamily="49" charset="0"/>
-              </a:rPr>
-              <a:t>-- (cons X </a:t>
-            </a:r>
-            <a:r>
-              <a:rPr lang="en-US" sz="1900" b="1" dirty="0" err="1" smtClean="0">
-                <a:latin typeface="Consolas" pitchFamily="49" charset="0"/>
-                <a:cs typeface="Consolas" pitchFamily="49" charset="0"/>
-              </a:rPr>
-              <a:t>ListOfX</a:t>
-            </a:r>
-            <a:r>
-              <a:rPr lang="en-US" sz="1900" b="1" dirty="0" smtClean="0">
-                <a:latin typeface="Consolas" pitchFamily="49" charset="0"/>
-                <a:cs typeface="Consolas" pitchFamily="49" charset="0"/>
-              </a:rPr>
-              <a:t>)</a:t>
-            </a:r>
-            <a:endParaRPr lang="en-US" sz="1900" b="1" dirty="0" smtClean="0">
-              <a:latin typeface="Consolas" pitchFamily="49" charset="0"/>
-              <a:cs typeface="Consolas" pitchFamily="49" charset="0"/>
-            </a:endParaRPr>
-          </a:p>
-          <a:p>
-            <a:pPr>
-              <a:buNone/>
-            </a:pPr>
-            <a:r>
-              <a:rPr lang="en-US" sz="1900" b="1" dirty="0">
-                <a:latin typeface="Consolas" pitchFamily="49" charset="0"/>
-                <a:cs typeface="Consolas" pitchFamily="49" charset="0"/>
-              </a:rPr>
-              <a:t> </a:t>
-            </a:r>
-            <a:r>
-              <a:rPr lang="en-US" sz="1900" b="1" dirty="0" smtClean="0">
-                <a:latin typeface="Consolas" pitchFamily="49" charset="0"/>
-                <a:cs typeface="Consolas" pitchFamily="49" charset="0"/>
-              </a:rPr>
-              <a:t>  </a:t>
+              <a:t>: (cons x </a:t>
             </a:r>
             <a:r>
               <a:rPr lang="en-US" sz="1900" b="1" dirty="0" err="1" smtClean="0">
@@ -7453,7 +7527,7 @@
                 <a:latin typeface="Consolas" pitchFamily="49" charset="0"/>
                 <a:cs typeface="Consolas" pitchFamily="49" charset="0"/>
               </a:rPr>
-              <a:t>interp</a:t>
+              <a:t>lst</a:t>
             </a:r>
             <a:r>
               <a:rPr lang="en-US" sz="1900" b="1" dirty="0" smtClean="0">
@@ -7466,57 +7540,8 @@
                 <a:latin typeface="Consolas" pitchFamily="49" charset="0"/>
                 <a:cs typeface="Consolas" pitchFamily="49" charset="0"/>
               </a:rPr>
-              <a:t>: (cons x </a:t>
-            </a:r>
-            <a:r>
-              <a:rPr lang="en-US" sz="1900" b="1" dirty="0" err="1" smtClean="0">
-                <a:solidFill>
-                  <a:schemeClr val="accent2">
-                    <a:lumMod val="60000"/>
-                    <a:lumOff val="40000"/>
-                  </a:schemeClr>
-                </a:solidFill>
-                <a:latin typeface="Consolas" pitchFamily="49" charset="0"/>
-                <a:cs typeface="Consolas" pitchFamily="49" charset="0"/>
-              </a:rPr>
-              <a:t>lst</a:t>
-            </a:r>
-            <a:r>
-              <a:rPr lang="en-US" sz="1900" b="1" dirty="0" smtClean="0">
-                <a:solidFill>
-                  <a:schemeClr val="accent2">
-                    <a:lumMod val="60000"/>
-                    <a:lumOff val="40000"/>
-                  </a:schemeClr>
-                </a:solidFill>
-                <a:latin typeface="Consolas" pitchFamily="49" charset="0"/>
-                <a:cs typeface="Consolas" pitchFamily="49" charset="0"/>
-              </a:rPr>
-              <a:t>) represents a </a:t>
-            </a:r>
-            <a:r>
-              <a:rPr lang="en-US" sz="1900" b="1" dirty="0" smtClean="0">
-                <a:solidFill>
-                  <a:schemeClr val="accent2">
-                    <a:lumMod val="60000"/>
-                    <a:lumOff val="40000"/>
-                  </a:schemeClr>
-                </a:solidFill>
-                <a:latin typeface="Consolas" pitchFamily="49" charset="0"/>
-                <a:cs typeface="Consolas" pitchFamily="49" charset="0"/>
-              </a:rPr>
-              <a:t>sequence of X's</a:t>
-            </a:r>
-            <a:endParaRPr lang="en-US" sz="1900" b="1" dirty="0" smtClean="0">
-              <a:solidFill>
-                <a:schemeClr val="accent2">
-                  <a:lumMod val="60000"/>
-                  <a:lumOff val="40000"/>
-                </a:schemeClr>
-              </a:solidFill>
-              <a:latin typeface="Consolas" pitchFamily="49" charset="0"/>
-              <a:cs typeface="Consolas" pitchFamily="49" charset="0"/>
-            </a:endParaRPr>
+              <a:t>) represents a sequence of X's</a:t>
+            </a:r>
           </a:p>
           <a:p>
             <a:pPr>
@@ -10622,14 +10647,7 @@
                 <a:latin typeface="Consolas" pitchFamily="49" charset="0"/>
                 <a:cs typeface="Consolas" pitchFamily="49" charset="0"/>
               </a:rPr>
-              <a:t> </a:t>
-            </a:r>
-            <a:r>
-              <a:rPr lang="en-US" b="1" dirty="0" smtClean="0">
-                <a:latin typeface="Consolas" pitchFamily="49" charset="0"/>
-                <a:cs typeface="Consolas" pitchFamily="49" charset="0"/>
-              </a:rPr>
-              <a:t>-&gt; Boolean</a:t>
+              <a:t> -&gt; Boolean</a:t>
             </a:r>
           </a:p>
           <a:p>
@@ -10962,14 +10980,7 @@
                 <a:latin typeface="Consolas" pitchFamily="49" charset="0"/>
                 <a:cs typeface="Consolas" pitchFamily="49" charset="0"/>
               </a:rPr>
-              <a:t> </a:t>
-            </a:r>
-            <a:r>
-              <a:rPr lang="en-US" b="1" dirty="0" smtClean="0">
-                <a:latin typeface="Consolas" pitchFamily="49" charset="0"/>
-                <a:cs typeface="Consolas" pitchFamily="49" charset="0"/>
-              </a:rPr>
-              <a:t>-&gt; X</a:t>
+              <a:t> -&gt; X</a:t>
             </a:r>
           </a:p>
           <a:p>
@@ -11244,14 +11255,7 @@
                 <a:latin typeface="Consolas" pitchFamily="49" charset="0"/>
                 <a:cs typeface="Consolas" pitchFamily="49" charset="0"/>
               </a:rPr>
-              <a:t> </a:t>
-            </a:r>
-            <a:r>
-              <a:rPr lang="en-US" b="1" dirty="0" smtClean="0">
-                <a:latin typeface="Consolas" pitchFamily="49" charset="0"/>
-                <a:cs typeface="Consolas" pitchFamily="49" charset="0"/>
-              </a:rPr>
-              <a:t>-&gt; </a:t>
+              <a:t> -&gt; </a:t>
             </a:r>
             <a:r>
               <a:rPr lang="en-US" b="1" dirty="0" err="1" smtClean="0">
@@ -13978,9 +13982,18 @@
           </a:p>
           <a:p>
             <a:r>
-              <a:rPr lang="en-US" dirty="0" smtClean="0"/>
-              <a:t>Do the Guided Practices</a:t>
-            </a:r>
+              <a:rPr lang="en-US" smtClean="0"/>
+              <a:t>Do </a:t>
+            </a:r>
+            <a:r>
+              <a:rPr lang="en-US" smtClean="0"/>
+              <a:t>Guided </a:t>
+            </a:r>
+            <a:r>
+              <a:rPr lang="en-US" smtClean="0"/>
+              <a:t>Practices 4.1 and 4.2</a:t>
+            </a:r>
+            <a:endParaRPr lang="en-US" dirty="0" smtClean="0"/>
           </a:p>
           <a:p>
             <a:r>
@@ -15570,29 +15583,6 @@
           </a:fontRef>
         </p:style>
       </p:cxnSp>
-      <p:sp>
-        <p:nvSpPr>
-          <p:cNvPr id="2" name="Slide Number Placeholder 1"/>
-          <p:cNvSpPr>
-            <a:spLocks noGrp="1"/>
-          </p:cNvSpPr>
-          <p:nvPr>
-            <p:ph type="sldNum" sz="quarter" idx="12"/>
-          </p:nvPr>
-        </p:nvSpPr>
-        <p:spPr/>
-        <p:txBody>
-          <a:bodyPr/>
-          <a:lstStyle/>
-          <a:p>
-            <a:fld id="{2AF3B5EA-18B6-4040-9F78-6052AF49C681}" type="slidenum">
-              <a:rPr lang="en-US" smtClean="0"/>
-              <a:t>3</a:t>
-            </a:fld>
-            <a:endParaRPr lang="en-US"/>
-          </a:p>
-        </p:txBody>
-      </p:sp>
     </p:spTree>
     <p:extLst>
       <p:ext uri="{BB962C8B-B14F-4D97-AF65-F5344CB8AC3E}">

</xml_diff>